<commit_message>
ajout du rapport final
</commit_message>
<xml_diff>
--- a/Mise en place d’une application RESTful Spring Boot.pptx
+++ b/Mise en place d’une application RESTful Spring Boot.pptx
@@ -269,7 +269,7 @@
           <a:p>
             <a:fld id="{ADD7F33F-A7CB-4993-8A43-759D8D71DF0F}" type="datetimeFigureOut">
               <a:rPr lang="fr-BF" smtClean="0"/>
-              <a:t>03/09/2024</a:t>
+              <a:t>14/09/2024</a:t>
             </a:fld>
             <a:endParaRPr lang="fr-BF"/>
           </a:p>
@@ -469,7 +469,7 @@
           <a:p>
             <a:fld id="{ADD7F33F-A7CB-4993-8A43-759D8D71DF0F}" type="datetimeFigureOut">
               <a:rPr lang="fr-BF" smtClean="0"/>
-              <a:t>03/09/2024</a:t>
+              <a:t>14/09/2024</a:t>
             </a:fld>
             <a:endParaRPr lang="fr-BF"/>
           </a:p>
@@ -679,7 +679,7 @@
           <a:p>
             <a:fld id="{ADD7F33F-A7CB-4993-8A43-759D8D71DF0F}" type="datetimeFigureOut">
               <a:rPr lang="fr-BF" smtClean="0"/>
-              <a:t>03/09/2024</a:t>
+              <a:t>14/09/2024</a:t>
             </a:fld>
             <a:endParaRPr lang="fr-BF"/>
           </a:p>
@@ -879,7 +879,7 @@
           <a:p>
             <a:fld id="{ADD7F33F-A7CB-4993-8A43-759D8D71DF0F}" type="datetimeFigureOut">
               <a:rPr lang="fr-BF" smtClean="0"/>
-              <a:t>03/09/2024</a:t>
+              <a:t>14/09/2024</a:t>
             </a:fld>
             <a:endParaRPr lang="fr-BF"/>
           </a:p>
@@ -1155,7 +1155,7 @@
           <a:p>
             <a:fld id="{ADD7F33F-A7CB-4993-8A43-759D8D71DF0F}" type="datetimeFigureOut">
               <a:rPr lang="fr-BF" smtClean="0"/>
-              <a:t>03/09/2024</a:t>
+              <a:t>14/09/2024</a:t>
             </a:fld>
             <a:endParaRPr lang="fr-BF"/>
           </a:p>
@@ -1423,7 +1423,7 @@
           <a:p>
             <a:fld id="{ADD7F33F-A7CB-4993-8A43-759D8D71DF0F}" type="datetimeFigureOut">
               <a:rPr lang="fr-BF" smtClean="0"/>
-              <a:t>03/09/2024</a:t>
+              <a:t>14/09/2024</a:t>
             </a:fld>
             <a:endParaRPr lang="fr-BF"/>
           </a:p>
@@ -1838,7 +1838,7 @@
           <a:p>
             <a:fld id="{ADD7F33F-A7CB-4993-8A43-759D8D71DF0F}" type="datetimeFigureOut">
               <a:rPr lang="fr-BF" smtClean="0"/>
-              <a:t>03/09/2024</a:t>
+              <a:t>14/09/2024</a:t>
             </a:fld>
             <a:endParaRPr lang="fr-BF"/>
           </a:p>
@@ -1980,7 +1980,7 @@
           <a:p>
             <a:fld id="{ADD7F33F-A7CB-4993-8A43-759D8D71DF0F}" type="datetimeFigureOut">
               <a:rPr lang="fr-BF" smtClean="0"/>
-              <a:t>03/09/2024</a:t>
+              <a:t>14/09/2024</a:t>
             </a:fld>
             <a:endParaRPr lang="fr-BF"/>
           </a:p>
@@ -2093,7 +2093,7 @@
           <a:p>
             <a:fld id="{ADD7F33F-A7CB-4993-8A43-759D8D71DF0F}" type="datetimeFigureOut">
               <a:rPr lang="fr-BF" smtClean="0"/>
-              <a:t>03/09/2024</a:t>
+              <a:t>14/09/2024</a:t>
             </a:fld>
             <a:endParaRPr lang="fr-BF"/>
           </a:p>
@@ -2406,7 +2406,7 @@
           <a:p>
             <a:fld id="{ADD7F33F-A7CB-4993-8A43-759D8D71DF0F}" type="datetimeFigureOut">
               <a:rPr lang="fr-BF" smtClean="0"/>
-              <a:t>03/09/2024</a:t>
+              <a:t>14/09/2024</a:t>
             </a:fld>
             <a:endParaRPr lang="fr-BF"/>
           </a:p>
@@ -2695,7 +2695,7 @@
           <a:p>
             <a:fld id="{ADD7F33F-A7CB-4993-8A43-759D8D71DF0F}" type="datetimeFigureOut">
               <a:rPr lang="fr-BF" smtClean="0"/>
-              <a:t>03/09/2024</a:t>
+              <a:t>14/09/2024</a:t>
             </a:fld>
             <a:endParaRPr lang="fr-BF"/>
           </a:p>
@@ -2938,7 +2938,7 @@
           <a:p>
             <a:fld id="{ADD7F33F-A7CB-4993-8A43-759D8D71DF0F}" type="datetimeFigureOut">
               <a:rPr lang="fr-BF" smtClean="0"/>
-              <a:t>03/09/2024</a:t>
+              <a:t>14/09/2024</a:t>
             </a:fld>
             <a:endParaRPr lang="fr-BF"/>
           </a:p>
@@ -3462,8 +3462,8 @@
         </p:nvSpPr>
         <p:spPr>
           <a:xfrm>
-            <a:off x="1524000" y="4453684"/>
-            <a:ext cx="9144000" cy="503797"/>
+            <a:off x="1523999" y="4453684"/>
+            <a:ext cx="9573087" cy="2089159"/>
           </a:xfrm>
           <a:prstGeom prst="rect">
             <a:avLst/>
@@ -3645,7 +3645,43 @@
               </a:rPr>
               <a:t>Groupe 4</a:t>
             </a:r>
-            <a:endParaRPr lang="fr-BF" b="1" dirty="0">
+          </a:p>
+          <a:p>
+            <a:r>
+              <a:rPr lang="fr-FR" sz="1100" b="1" dirty="0">
+                <a:latin typeface="Times New Roman" panose="02020603050405020304" pitchFamily="18" charset="0"/>
+                <a:cs typeface="Times New Roman" panose="02020603050405020304" pitchFamily="18" charset="0"/>
+              </a:rPr>
+              <a:t>TRAORE ISSOUF </a:t>
+            </a:r>
+          </a:p>
+          <a:p>
+            <a:r>
+              <a:rPr lang="fr-FR" sz="1100" b="1" dirty="0">
+                <a:latin typeface="Times New Roman" panose="02020603050405020304" pitchFamily="18" charset="0"/>
+                <a:cs typeface="Times New Roman" panose="02020603050405020304" pitchFamily="18" charset="0"/>
+              </a:rPr>
+              <a:t>OUEDRAOGO SOULEYMANE</a:t>
+            </a:r>
+          </a:p>
+          <a:p>
+            <a:r>
+              <a:rPr lang="fr-FR" sz="1100" b="1" dirty="0">
+                <a:latin typeface="Times New Roman" panose="02020603050405020304" pitchFamily="18" charset="0"/>
+                <a:cs typeface="Times New Roman" panose="02020603050405020304" pitchFamily="18" charset="0"/>
+              </a:rPr>
+              <a:t>OURDRAOGO ROCK</a:t>
+            </a:r>
+          </a:p>
+          <a:p>
+            <a:r>
+              <a:rPr lang="fr-FR" sz="1100" b="1" dirty="0">
+                <a:latin typeface="Times New Roman" panose="02020603050405020304" pitchFamily="18" charset="0"/>
+                <a:cs typeface="Times New Roman" panose="02020603050405020304" pitchFamily="18" charset="0"/>
+              </a:rPr>
+              <a:t>MILLOGO NOCOLAS</a:t>
+            </a:r>
+            <a:endParaRPr lang="fr-BF" sz="1100" b="1" dirty="0">
               <a:latin typeface="Times New Roman" panose="02020603050405020304" pitchFamily="18" charset="0"/>
               <a:cs typeface="Times New Roman" panose="02020603050405020304" pitchFamily="18" charset="0"/>
             </a:endParaRPr>
@@ -3668,8 +3704,8 @@
         </p:nvSpPr>
         <p:spPr>
           <a:xfrm>
-            <a:off x="4589929" y="5231840"/>
-            <a:ext cx="3012141" cy="503797"/>
+            <a:off x="4662343" y="6328232"/>
+            <a:ext cx="2867314" cy="529768"/>
           </a:xfrm>
           <a:prstGeom prst="rect">
             <a:avLst/>

</xml_diff>